<commit_message>
FHIR- 34724 : update to lab and procedures
</commit_message>
<xml_diff>
--- a/input/images-source/uscdi_icons.pptx
+++ b/input/images-source/uscdi_icons.pptx
@@ -6,6 +6,7 @@
   </p:sldMasterIdLst>
   <p:sldIdLst>
     <p:sldId id="256" r:id="rId2"/>
+    <p:sldId id="257" r:id="rId3"/>
   </p:sldIdLst>
   <p:sldSz cx="12192000" cy="6858000"/>
   <p:notesSz cx="6858000" cy="9144000"/>
@@ -3343,8 +3344,8 @@
         </p:blipFill>
         <p:spPr>
           <a:xfrm>
-            <a:off x="2183872" y="875065"/>
-            <a:ext cx="300434" cy="365760"/>
+            <a:off x="6686796" y="2985701"/>
+            <a:ext cx="3004339" cy="3657600"/>
           </a:xfrm>
           <a:prstGeom prst="rect">
             <a:avLst/>
@@ -3377,8 +3378,8 @@
         </p:blipFill>
         <p:spPr>
           <a:xfrm>
-            <a:off x="3701119" y="875065"/>
-            <a:ext cx="345643" cy="384048"/>
+            <a:off x="4552889" y="474473"/>
+            <a:ext cx="342900" cy="381000"/>
           </a:xfrm>
           <a:prstGeom prst="rect">
             <a:avLst/>
@@ -3448,8 +3449,8 @@
         </p:blipFill>
         <p:spPr>
           <a:xfrm>
-            <a:off x="6302695" y="893353"/>
-            <a:ext cx="320933" cy="365760"/>
+            <a:off x="1392493" y="1143007"/>
+            <a:ext cx="4813995" cy="5486400"/>
           </a:xfrm>
           <a:prstGeom prst="rect">
             <a:avLst/>
@@ -3469,20 +3470,21 @@
               </a:ext>
             </a:extLst>
           </p:cNvPr>
-          <p:cNvPicPr preferRelativeResize="0"/>
+          <p:cNvPicPr>
+            <a:picLocks noChangeAspect="1"/>
+          </p:cNvPicPr>
           <p:nvPr/>
         </p:nvPicPr>
         <p:blipFill rotWithShape="1">
           <a:blip r:embed="rId6">
             <a:alphaModFix/>
           </a:blip>
-          <a:srcRect/>
           <a:stretch/>
         </p:blipFill>
         <p:spPr>
           <a:xfrm>
-            <a:off x="7353218" y="884209"/>
-            <a:ext cx="347471" cy="365760"/>
+            <a:off x="7353220" y="884209"/>
+            <a:ext cx="11674593" cy="13350240"/>
           </a:xfrm>
           <a:prstGeom prst="rect">
             <a:avLst/>
@@ -3655,7 +3657,7 @@
         <p:spPr>
           <a:xfrm>
             <a:off x="7353219" y="2358839"/>
-            <a:ext cx="386059" cy="365760"/>
+            <a:ext cx="13042900" cy="12357100"/>
           </a:xfrm>
           <a:prstGeom prst="rect">
             <a:avLst/>
@@ -3688,8 +3690,8 @@
         </p:blipFill>
         <p:spPr>
           <a:xfrm>
-            <a:off x="8438044" y="2358839"/>
-            <a:ext cx="206375" cy="365760"/>
+            <a:off x="-499276" y="3504998"/>
+            <a:ext cx="9539706" cy="16907256"/>
           </a:xfrm>
           <a:prstGeom prst="rect">
             <a:avLst/>
@@ -3722,8 +3724,8 @@
         </p:blipFill>
         <p:spPr>
           <a:xfrm>
-            <a:off x="9599361" y="2358839"/>
-            <a:ext cx="301644" cy="365760"/>
+            <a:off x="2775432" y="3447525"/>
+            <a:ext cx="11531600" cy="13982700"/>
           </a:xfrm>
           <a:prstGeom prst="rect">
             <a:avLst/>
@@ -3757,7 +3759,7 @@
         <p:spPr>
           <a:xfrm>
             <a:off x="10435975" y="2338882"/>
-            <a:ext cx="315791" cy="365760"/>
+            <a:ext cx="11798300" cy="13665200"/>
           </a:xfrm>
           <a:prstGeom prst="rect">
             <a:avLst/>
@@ -3791,7 +3793,7 @@
         <p:spPr>
           <a:xfrm>
             <a:off x="11247091" y="2338882"/>
-            <a:ext cx="365760" cy="365760"/>
+            <a:ext cx="266700" cy="266700"/>
           </a:xfrm>
           <a:prstGeom prst="rect">
             <a:avLst/>
@@ -3824,8 +3826,8 @@
         </p:blipFill>
         <p:spPr>
           <a:xfrm>
-            <a:off x="6340165" y="2299697"/>
-            <a:ext cx="572673" cy="365760"/>
+            <a:off x="1669946" y="3373530"/>
+            <a:ext cx="15887700" cy="10147300"/>
           </a:xfrm>
           <a:prstGeom prst="rect">
             <a:avLst/>
@@ -3904,10 +3906,106 @@
           </a:ln>
         </p:spPr>
       </p:pic>
+      <p:pic>
+        <p:nvPicPr>
+          <p:cNvPr id="23" name="Google Shape;330;p31">
+            <a:extLst>
+              <a:ext uri="{FF2B5EF4-FFF2-40B4-BE49-F238E27FC236}">
+                <a16:creationId xmlns:a16="http://schemas.microsoft.com/office/drawing/2014/main" id="{C90F98FD-6F59-8950-FF5F-E62170CACAFA}"/>
+              </a:ext>
+            </a:extLst>
+          </p:cNvPr>
+          <p:cNvPicPr>
+            <a:picLocks noChangeAspect="1"/>
+          </p:cNvPicPr>
+          <p:nvPr/>
+        </p:nvPicPr>
+        <p:blipFill rotWithShape="1">
+          <a:blip r:embed="rId19">
+            <a:alphaModFix/>
+          </a:blip>
+          <a:stretch/>
+        </p:blipFill>
+        <p:spPr>
+          <a:xfrm>
+            <a:off x="2159639" y="2332103"/>
+            <a:ext cx="2884398" cy="2935224"/>
+          </a:xfrm>
+          <a:prstGeom prst="rect">
+            <a:avLst/>
+          </a:prstGeom>
+          <a:noFill/>
+          <a:ln>
+            <a:noFill/>
+          </a:ln>
+        </p:spPr>
+      </p:pic>
     </p:spTree>
     <p:extLst>
       <p:ext uri="{BB962C8B-B14F-4D97-AF65-F5344CB8AC3E}">
         <p14:creationId xmlns:p14="http://schemas.microsoft.com/office/powerpoint/2010/main" val="2831859948"/>
+      </p:ext>
+    </p:extLst>
+  </p:cSld>
+  <p:clrMapOvr>
+    <a:masterClrMapping/>
+  </p:clrMapOvr>
+</p:sld>
+</file>
+
+<file path=ppt/slides/slide2.xml><?xml version="1.0" encoding="utf-8"?>
+<p:sld xmlns:a="http://schemas.openxmlformats.org/drawingml/2006/main" xmlns:r="http://schemas.openxmlformats.org/officeDocument/2006/relationships" xmlns:p="http://schemas.openxmlformats.org/presentationml/2006/main">
+  <p:cSld>
+    <p:spTree>
+      <p:nvGrpSpPr>
+        <p:cNvPr id="1" name=""/>
+        <p:cNvGrpSpPr/>
+        <p:nvPr/>
+      </p:nvGrpSpPr>
+      <p:grpSpPr>
+        <a:xfrm>
+          <a:off x="0" y="0"/>
+          <a:ext cx="0" cy="0"/>
+          <a:chOff x="0" y="0"/>
+          <a:chExt cx="0" cy="0"/>
+        </a:xfrm>
+      </p:grpSpPr>
+      <p:pic>
+        <p:nvPicPr>
+          <p:cNvPr id="2" name="Google Shape;284;p31">
+            <a:extLst>
+              <a:ext uri="{FF2B5EF4-FFF2-40B4-BE49-F238E27FC236}">
+                <a16:creationId xmlns:a16="http://schemas.microsoft.com/office/drawing/2014/main" id="{45A4B894-8DCB-4619-9FE5-31BD98772D12}"/>
+              </a:ext>
+            </a:extLst>
+          </p:cNvPr>
+          <p:cNvPicPr preferRelativeResize="0"/>
+          <p:nvPr/>
+        </p:nvPicPr>
+        <p:blipFill rotWithShape="1">
+          <a:blip r:embed="rId2">
+            <a:alphaModFix/>
+          </a:blip>
+          <a:stretch/>
+        </p:blipFill>
+        <p:spPr>
+          <a:xfrm>
+            <a:off x="5288319" y="3144538"/>
+            <a:ext cx="4622800" cy="1600200"/>
+          </a:xfrm>
+          <a:prstGeom prst="rect">
+            <a:avLst/>
+          </a:prstGeom>
+          <a:noFill/>
+          <a:ln>
+            <a:noFill/>
+          </a:ln>
+        </p:spPr>
+      </p:pic>
+    </p:spTree>
+    <p:extLst>
+      <p:ext uri="{BB962C8B-B14F-4D97-AF65-F5344CB8AC3E}">
+        <p14:creationId xmlns:p14="http://schemas.microsoft.com/office/powerpoint/2010/main" val="3542577980"/>
       </p:ext>
     </p:extLst>
   </p:cSld>

</xml_diff>